<commit_message>
updates from morning class
</commit_message>
<xml_diff>
--- a/format-encodings/documents/ARCHIVE/introduction-to-numbering-systems.pptx
+++ b/format-encodings/documents/ARCHIVE/introduction-to-numbering-systems.pptx
@@ -1541,7 +1541,7 @@
               </a:spcAft>
               <a:buNone/>
             </a:pPr>
-            <a:endParaRPr/>
+            <a:endParaRPr dirty="0"/>
           </a:p>
         </p:txBody>
       </p:sp>
@@ -10250,6 +10250,42 @@
           </a:p>
         </p:txBody>
       </p:sp>
+      <p:cxnSp>
+        <p:nvCxnSpPr>
+          <p:cNvPr id="10" name="Straight Connector 9">
+            <a:extLst>
+              <a:ext uri="{FF2B5EF4-FFF2-40B4-BE49-F238E27FC236}">
+                <a16:creationId xmlns:a16="http://schemas.microsoft.com/office/drawing/2014/main" id="{DE83E4A3-239A-DD4E-A086-1D2260EE0D21}"/>
+              </a:ext>
+            </a:extLst>
+          </p:cNvPr>
+          <p:cNvCxnSpPr/>
+          <p:nvPr/>
+        </p:nvCxnSpPr>
+        <p:spPr>
+          <a:xfrm>
+            <a:off x="1699379" y="4106636"/>
+            <a:ext cx="473934" cy="669471"/>
+          </a:xfrm>
+          <a:prstGeom prst="line">
+            <a:avLst/>
+          </a:prstGeom>
+        </p:spPr>
+        <p:style>
+          <a:lnRef idx="1">
+            <a:schemeClr val="accent1"/>
+          </a:lnRef>
+          <a:fillRef idx="0">
+            <a:schemeClr val="accent1"/>
+          </a:fillRef>
+          <a:effectRef idx="0">
+            <a:schemeClr val="accent1"/>
+          </a:effectRef>
+          <a:fontRef idx="minor">
+            <a:schemeClr val="tx1"/>
+          </a:fontRef>
+        </p:style>
+      </p:cxnSp>
     </p:spTree>
   </p:cSld>
   <p:clrMapOvr>
@@ -10536,10 +10572,10 @@
               <a:buNone/>
             </a:pPr>
             <a:r>
-              <a:rPr lang="en"/>
+              <a:rPr lang="en" dirty="0"/>
               <a:t>Original number: - 0.000100101</a:t>
             </a:r>
-            <a:endParaRPr/>
+            <a:endParaRPr dirty="0"/>
           </a:p>
           <a:p>
             <a:pPr marL="0" lvl="0" indent="0" algn="l" rtl="0">
@@ -10552,14 +10588,14 @@
               <a:buNone/>
             </a:pPr>
             <a:r>
-              <a:rPr lang="en"/>
+              <a:rPr lang="en" dirty="0"/>
               <a:t>Recall Scientific Notation:   - 1.0100101  x 2 </a:t>
             </a:r>
             <a:r>
-              <a:rPr lang="en" baseline="30000"/>
+              <a:rPr lang="en" baseline="30000" dirty="0"/>
               <a:t>- 100 (4)</a:t>
             </a:r>
-            <a:endParaRPr/>
+            <a:endParaRPr dirty="0"/>
           </a:p>
           <a:p>
             <a:pPr marL="457200" lvl="0" indent="-325755" algn="l" rtl="0">
@@ -10573,10 +10609,10 @@
               <a:buChar char="●"/>
             </a:pPr>
             <a:r>
-              <a:rPr lang="en"/>
+              <a:rPr lang="en" dirty="0"/>
               <a:t>Components to Encode</a:t>
             </a:r>
-            <a:endParaRPr/>
+            <a:endParaRPr dirty="0"/>
           </a:p>
           <a:p>
             <a:pPr marL="914400" lvl="1" indent="-304165" algn="l" rtl="0">
@@ -10590,10 +10626,10 @@
               <a:buChar char="○"/>
             </a:pPr>
             <a:r>
-              <a:rPr lang="en"/>
+              <a:rPr lang="en" dirty="0"/>
               <a:t>sign: negative </a:t>
             </a:r>
-            <a:endParaRPr/>
+            <a:endParaRPr dirty="0"/>
           </a:p>
           <a:p>
             <a:pPr marL="914400" lvl="1" indent="-304165" algn="l" rtl="0">
@@ -10607,10 +10643,10 @@
               <a:buChar char="○"/>
             </a:pPr>
             <a:r>
-              <a:rPr lang="en"/>
+              <a:rPr lang="en" dirty="0"/>
               <a:t>significant or the mantissa:  0100101</a:t>
             </a:r>
-            <a:endParaRPr/>
+            <a:endParaRPr dirty="0"/>
           </a:p>
           <a:p>
             <a:pPr marL="914400" lvl="1" indent="-304165" algn="l" rtl="0">
@@ -10624,10 +10660,10 @@
               <a:buChar char="○"/>
             </a:pPr>
             <a:r>
-              <a:rPr lang="en"/>
+              <a:rPr lang="en" dirty="0"/>
               <a:t>exponent: - 100    </a:t>
             </a:r>
-            <a:endParaRPr/>
+            <a:endParaRPr dirty="0"/>
           </a:p>
           <a:p>
             <a:pPr marL="1371600" lvl="2" indent="-304164" algn="l" rtl="0">
@@ -10641,10 +10677,10 @@
               <a:buChar char="■"/>
             </a:pPr>
             <a:r>
-              <a:rPr lang="en"/>
+              <a:rPr lang="en" dirty="0"/>
               <a:t>Issue:  negative exponents</a:t>
             </a:r>
-            <a:endParaRPr/>
+            <a:endParaRPr dirty="0"/>
           </a:p>
           <a:p>
             <a:pPr marL="1371600" lvl="2" indent="-304164" algn="l" rtl="0">
@@ -10658,10 +10694,10 @@
               <a:buChar char="■"/>
             </a:pPr>
             <a:r>
-              <a:rPr lang="en"/>
+              <a:rPr lang="en" dirty="0"/>
               <a:t>Solution: store values with a bias</a:t>
             </a:r>
-            <a:endParaRPr/>
+            <a:endParaRPr dirty="0"/>
           </a:p>
           <a:p>
             <a:pPr marL="457200" lvl="0" indent="-325755" algn="l" rtl="0">
@@ -10675,10 +10711,10 @@
               <a:buChar char="●"/>
             </a:pPr>
             <a:r>
-              <a:rPr lang="en"/>
+              <a:rPr lang="en" dirty="0"/>
               <a:t>Bias:</a:t>
             </a:r>
-            <a:endParaRPr/>
+            <a:endParaRPr dirty="0"/>
           </a:p>
           <a:p>
             <a:pPr marL="914400" lvl="1" indent="-304165" algn="l" rtl="0">
@@ -10692,10 +10728,10 @@
               <a:buChar char="○"/>
             </a:pPr>
             <a:r>
-              <a:rPr lang="en"/>
+              <a:rPr lang="en" dirty="0"/>
               <a:t>Shift all numbers along the number line by N</a:t>
             </a:r>
-            <a:endParaRPr/>
+            <a:endParaRPr dirty="0"/>
           </a:p>
           <a:p>
             <a:pPr marL="914400" lvl="1" indent="-304165" algn="l" rtl="0">
@@ -10709,10 +10745,10 @@
               <a:buChar char="○"/>
             </a:pPr>
             <a:r>
-              <a:rPr lang="en"/>
+              <a:rPr lang="en" dirty="0"/>
               <a:t>Typically it is half the range:</a:t>
             </a:r>
-            <a:endParaRPr/>
+            <a:endParaRPr dirty="0"/>
           </a:p>
           <a:p>
             <a:pPr marL="1371600" lvl="2" indent="-304164" algn="l" rtl="0">
@@ -10726,7 +10762,7 @@
               <a:buChar char="■"/>
             </a:pPr>
             <a:r>
-              <a:rPr lang="en">
+              <a:rPr lang="en" dirty="0">
                 <a:latin typeface="Source Code Pro"/>
                 <a:ea typeface="Source Code Pro"/>
                 <a:cs typeface="Source Code Pro"/>
@@ -10734,7 +10770,7 @@
               </a:rPr>
               <a:t>3 bits -&gt;             011 == 3</a:t>
             </a:r>
-            <a:endParaRPr>
+            <a:endParaRPr dirty="0">
               <a:latin typeface="Source Code Pro"/>
               <a:ea typeface="Source Code Pro"/>
               <a:cs typeface="Source Code Pro"/>
@@ -10753,7 +10789,7 @@
               <a:buChar char="■"/>
             </a:pPr>
             <a:r>
-              <a:rPr lang="en">
+              <a:rPr lang="en" dirty="0">
                 <a:latin typeface="Source Code Pro"/>
                 <a:ea typeface="Source Code Pro"/>
                 <a:cs typeface="Source Code Pro"/>
@@ -10761,7 +10797,7 @@
               </a:rPr>
               <a:t>5 bits -&gt;          0 1111 == 15</a:t>
             </a:r>
-            <a:endParaRPr>
+            <a:endParaRPr dirty="0">
               <a:latin typeface="Source Code Pro"/>
               <a:ea typeface="Source Code Pro"/>
               <a:cs typeface="Source Code Pro"/>
@@ -10780,7 +10816,7 @@
               <a:buChar char="■"/>
             </a:pPr>
             <a:r>
-              <a:rPr lang="en">
+              <a:rPr lang="en" dirty="0">
                 <a:latin typeface="Source Code Pro"/>
                 <a:ea typeface="Source Code Pro"/>
                 <a:cs typeface="Source Code Pro"/>
@@ -10788,7 +10824,7 @@
               </a:rPr>
               <a:t>8 bits -&gt;       0111 1111 == 127</a:t>
             </a:r>
-            <a:endParaRPr>
+            <a:endParaRPr dirty="0">
               <a:latin typeface="Source Code Pro"/>
               <a:ea typeface="Source Code Pro"/>
               <a:cs typeface="Source Code Pro"/>
@@ -10807,7 +10843,7 @@
               <a:buChar char="■"/>
             </a:pPr>
             <a:r>
-              <a:rPr lang="en">
+              <a:rPr lang="en" dirty="0">
                 <a:latin typeface="Source Code Pro"/>
                 <a:ea typeface="Source Code Pro"/>
                 <a:cs typeface="Source Code Pro"/>
@@ -10815,7 +10851,7 @@
               </a:rPr>
               <a:t>11 bits -&gt;  011 1111 1111 == 1023</a:t>
             </a:r>
-            <a:endParaRPr>
+            <a:endParaRPr dirty="0">
               <a:latin typeface="Source Code Pro"/>
               <a:ea typeface="Source Code Pro"/>
               <a:cs typeface="Source Code Pro"/>
@@ -13113,7 +13149,7 @@
             </a:pPr>
             <a:r>
               <a:rPr lang="en" dirty="0"/>
-              <a:t>4.225 x10^ 2</a:t>
+              <a:t>4.225 x10^ 1</a:t>
             </a:r>
             <a:endParaRPr dirty="0"/>
           </a:p>
@@ -13130,7 +13166,7 @@
             </a:pPr>
             <a:r>
               <a:rPr lang="en" dirty="0"/>
-              <a:t>4.225E02	(calculators)</a:t>
+              <a:t>4.225E01	(calculators)</a:t>
             </a:r>
             <a:endParaRPr dirty="0"/>
           </a:p>
@@ -13659,10 +13695,10 @@
               <a:buChar char="●"/>
             </a:pPr>
             <a:r>
-              <a:rPr lang="en"/>
+              <a:rPr lang="en" dirty="0"/>
               <a:t>Recall the Universal Computer</a:t>
             </a:r>
-            <a:endParaRPr/>
+            <a:endParaRPr dirty="0"/>
           </a:p>
           <a:p>
             <a:pPr marL="914400" lvl="1" indent="-317500" algn="l" rtl="0">
@@ -13676,10 +13712,10 @@
               <a:buChar char="○"/>
             </a:pPr>
             <a:r>
-              <a:rPr lang="en"/>
+              <a:rPr lang="en" dirty="0"/>
               <a:t>There is a limited tape size to perform calculation</a:t>
             </a:r>
-            <a:endParaRPr/>
+            <a:endParaRPr dirty="0"/>
           </a:p>
           <a:p>
             <a:pPr marL="457200" lvl="0" indent="-342900" algn="l" rtl="0">
@@ -13693,10 +13729,10 @@
               <a:buChar char="●"/>
             </a:pPr>
             <a:r>
-              <a:rPr lang="en"/>
+              <a:rPr lang="en" dirty="0"/>
               <a:t>Recall the von Neumann and Harvard architecture</a:t>
             </a:r>
-            <a:endParaRPr/>
+            <a:endParaRPr dirty="0"/>
           </a:p>
           <a:p>
             <a:pPr marL="914400" lvl="1" indent="-317500" algn="l" rtl="0">
@@ -13710,10 +13746,10 @@
               <a:buChar char="○"/>
             </a:pPr>
             <a:r>
-              <a:rPr lang="en"/>
+              <a:rPr lang="en" dirty="0"/>
               <a:t>There is a predefined width to registers and memory</a:t>
             </a:r>
-            <a:endParaRPr/>
+            <a:endParaRPr dirty="0"/>
           </a:p>
           <a:p>
             <a:pPr marL="457200" lvl="0" indent="-342900" algn="l" rtl="0">
@@ -13727,10 +13763,10 @@
               <a:buChar char="●"/>
             </a:pPr>
             <a:r>
-              <a:rPr lang="en"/>
+              <a:rPr lang="en" dirty="0"/>
               <a:t>Abstract representations with limited sizes for:</a:t>
             </a:r>
-            <a:endParaRPr/>
+            <a:endParaRPr dirty="0"/>
           </a:p>
           <a:p>
             <a:pPr marL="914400" lvl="1" indent="-317500" algn="l" rtl="0">
@@ -13744,10 +13780,10 @@
               <a:buChar char="○"/>
             </a:pPr>
             <a:r>
-              <a:rPr lang="en"/>
+              <a:rPr lang="en" dirty="0"/>
               <a:t>Natural Numbers &amp; Zero:	unsigned char, unsigned int</a:t>
             </a:r>
-            <a:endParaRPr/>
+            <a:endParaRPr dirty="0"/>
           </a:p>
           <a:p>
             <a:pPr marL="914400" lvl="1" indent="-317500" algn="l" rtl="0">
@@ -13761,10 +13797,10 @@
               <a:buChar char="○"/>
             </a:pPr>
             <a:r>
-              <a:rPr lang="en"/>
-              <a:t>Integers:				short int, int, long int, long long int</a:t>
+              <a:rPr lang="en" dirty="0"/>
+              <a:t>Integers:			short int, int, long int, long long int</a:t>
             </a:r>
-            <a:endParaRPr/>
+            <a:endParaRPr dirty="0"/>
           </a:p>
           <a:p>
             <a:pPr marL="914400" lvl="1" indent="-317500" algn="l" rtl="0">
@@ -13778,10 +13814,10 @@
               <a:buChar char="○"/>
             </a:pPr>
             <a:r>
-              <a:rPr lang="en"/>
+              <a:rPr lang="en" dirty="0"/>
               <a:t>Rational/Real:</a:t>
             </a:r>
-            <a:endParaRPr/>
+            <a:endParaRPr dirty="0"/>
           </a:p>
           <a:p>
             <a:pPr marL="1371600" lvl="2" indent="-317500" algn="l" rtl="0">
@@ -13795,10 +13831,10 @@
               <a:buChar char="■"/>
             </a:pPr>
             <a:r>
-              <a:rPr lang="en"/>
-              <a:t>Fix Point			---</a:t>
+              <a:rPr lang="en" dirty="0"/>
+              <a:t>Fix Point		---</a:t>
             </a:r>
-            <a:endParaRPr/>
+            <a:endParaRPr dirty="0"/>
           </a:p>
           <a:p>
             <a:pPr marL="1371600" lvl="2" indent="-317500" algn="l" rtl="0">
@@ -13812,13 +13848,13 @@
               <a:buChar char="■"/>
             </a:pPr>
             <a:r>
-              <a:rPr lang="en"/>
-              <a:t>Floating Point		float (singal), double</a:t>
+              <a:rPr lang="en" dirty="0"/>
+              <a:t>Floating Point		float (single), double</a:t>
             </a:r>
             <a:br>
-              <a:rPr lang="en"/>
+              <a:rPr lang="en" dirty="0"/>
             </a:br>
-            <a:endParaRPr/>
+            <a:endParaRPr dirty="0"/>
           </a:p>
           <a:p>
             <a:pPr marL="457200" lvl="0" indent="-342900" algn="l" rtl="0">
@@ -13832,10 +13868,10 @@
               <a:buChar char="●"/>
             </a:pPr>
             <a:r>
-              <a:rPr lang="en"/>
+              <a:rPr lang="en" dirty="0"/>
               <a:t>An encoding of each will include one or more of the following:</a:t>
             </a:r>
-            <a:endParaRPr/>
+            <a:endParaRPr dirty="0"/>
           </a:p>
         </p:txBody>
       </p:sp>
@@ -14838,11 +14874,17 @@
         <p:nvGraphicFramePr>
           <p:cNvPr id="86" name="Google Shape;86;p16"/>
           <p:cNvGraphicFramePr/>
-          <p:nvPr/>
+          <p:nvPr>
+            <p:extLst>
+              <p:ext uri="{D42A27DB-BD31-4B8C-83A1-F6EECF244321}">
+                <p14:modId xmlns:p14="http://schemas.microsoft.com/office/powerpoint/2010/main" val="2691966526"/>
+              </p:ext>
+            </p:extLst>
+          </p:nvPr>
         </p:nvGraphicFramePr>
         <p:xfrm>
           <a:off x="957925" y="4186650"/>
-          <a:ext cx="5828700" cy="731460"/>
+          <a:ext cx="5828700" cy="1008099"/>
         </p:xfrm>
         <a:graphic>
           <a:graphicData uri="http://schemas.openxmlformats.org/drawingml/2006/table">
@@ -15020,7 +15062,7 @@
                   </a:ext>
                 </a:extLst>
               </a:tr>
-              <a:tr h="286350">
+              <a:tr h="642369">
                 <a:tc>
                   <a:txBody>
                     <a:bodyPr/>
@@ -15216,10 +15258,10 @@
                         <a:buNone/>
                       </a:pPr>
                       <a:r>
-                        <a:rPr lang="en" sz="1200"/>
+                        <a:rPr lang="en" sz="1200" dirty="0"/>
                         <a:t>4</a:t>
                       </a:r>
-                      <a:endParaRPr sz="1200"/>
+                      <a:endParaRPr sz="1200" dirty="0"/>
                     </a:p>
                   </a:txBody>
                   <a:tcPr marL="91425" marR="91425" marT="91425" marB="91425">
@@ -20557,7 +20599,13 @@
         <p:nvGraphicFramePr>
           <p:cNvPr id="121" name="Google Shape;121;p20"/>
           <p:cNvGraphicFramePr/>
-          <p:nvPr/>
+          <p:nvPr>
+            <p:extLst>
+              <p:ext uri="{D42A27DB-BD31-4B8C-83A1-F6EECF244321}">
+                <p14:modId xmlns:p14="http://schemas.microsoft.com/office/powerpoint/2010/main" val="237901420"/>
+              </p:ext>
+            </p:extLst>
+          </p:nvPr>
         </p:nvGraphicFramePr>
         <p:xfrm>
           <a:off x="3460975" y="560525"/>
@@ -20730,16 +20778,16 @@
                         <a:buNone/>
                       </a:pPr>
                       <a:r>
-                        <a:rPr lang="en">
+                        <a:rPr lang="en" dirty="0">
                           <a:solidFill>
-                            <a:schemeClr val="lt2"/>
+                            <a:schemeClr val="tx1"/>
                           </a:solidFill>
                         </a:rPr>
                         <a:t>128</a:t>
                       </a:r>
-                      <a:endParaRPr>
+                      <a:endParaRPr dirty="0">
                         <a:solidFill>
-                          <a:schemeClr val="lt2"/>
+                          <a:schemeClr val="tx1"/>
                         </a:solidFill>
                       </a:endParaRPr>
                     </a:p>
@@ -20909,16 +20957,16 @@
                         <a:buNone/>
                       </a:pPr>
                       <a:r>
-                        <a:rPr lang="en">
+                        <a:rPr lang="en" dirty="0">
                           <a:solidFill>
-                            <a:schemeClr val="lt2"/>
+                            <a:schemeClr val="tx1"/>
                           </a:solidFill>
                         </a:rPr>
                         <a:t>0</a:t>
                       </a:r>
-                      <a:endParaRPr>
+                      <a:endParaRPr dirty="0">
                         <a:solidFill>
-                          <a:schemeClr val="lt2"/>
+                          <a:schemeClr val="tx1"/>
                         </a:solidFill>
                       </a:endParaRPr>
                     </a:p>
@@ -21088,16 +21136,16 @@
                         <a:buNone/>
                       </a:pPr>
                       <a:r>
-                        <a:rPr lang="en">
+                        <a:rPr lang="en" dirty="0">
                           <a:solidFill>
-                            <a:schemeClr val="lt2"/>
+                            <a:schemeClr val="tx1"/>
                           </a:solidFill>
                         </a:rPr>
                         <a:t>0</a:t>
                       </a:r>
-                      <a:endParaRPr>
+                      <a:endParaRPr dirty="0">
                         <a:solidFill>
-                          <a:schemeClr val="lt2"/>
+                          <a:schemeClr val="tx1"/>
                         </a:solidFill>
                       </a:endParaRPr>
                     </a:p>
@@ -21376,7 +21424,7 @@
                         <a:buNone/>
                       </a:pPr>
                       <a:r>
-                        <a:rPr lang="en">
+                        <a:rPr lang="en" dirty="0">
                           <a:latin typeface="Source Code Pro"/>
                           <a:ea typeface="Source Code Pro"/>
                           <a:cs typeface="Source Code Pro"/>
@@ -21384,7 +21432,7 @@
                         </a:rPr>
                         <a:t>+  1 x 2^3</a:t>
                       </a:r>
-                      <a:endParaRPr>
+                      <a:endParaRPr dirty="0">
                         <a:latin typeface="Source Code Pro"/>
                         <a:ea typeface="Source Code Pro"/>
                         <a:cs typeface="Source Code Pro"/>
@@ -21625,14 +21673,14 @@
                         <a:buNone/>
                       </a:pPr>
                       <a:r>
-                        <a:rPr lang="en">
+                        <a:rPr lang="en" dirty="0">
                           <a:solidFill>
                             <a:schemeClr val="lt2"/>
                           </a:solidFill>
                         </a:rPr>
                         <a:t>0</a:t>
                       </a:r>
-                      <a:endParaRPr>
+                      <a:endParaRPr dirty="0">
                         <a:solidFill>
                           <a:schemeClr val="lt2"/>
                         </a:solidFill>
@@ -21983,14 +22031,14 @@
                         <a:buNone/>
                       </a:pPr>
                       <a:r>
-                        <a:rPr lang="en">
+                        <a:rPr lang="en" dirty="0">
                           <a:solidFill>
                             <a:schemeClr val="lt2"/>
                           </a:solidFill>
                         </a:rPr>
                         <a:t>0</a:t>
                       </a:r>
-                      <a:endParaRPr>
+                      <a:endParaRPr dirty="0">
                         <a:solidFill>
                           <a:schemeClr val="lt2"/>
                         </a:solidFill>
@@ -22148,7 +22196,7 @@
                         <a:buNone/>
                       </a:pPr>
                       <a:r>
-                        <a:rPr lang="en">
+                        <a:rPr lang="en" dirty="0">
                           <a:solidFill>
                             <a:schemeClr val="lt2"/>
                           </a:solidFill>
@@ -22159,7 +22207,7 @@
                         </a:rPr>
                         <a:t>154</a:t>
                       </a:r>
-                      <a:endParaRPr>
+                      <a:endParaRPr dirty="0">
                         <a:solidFill>
                           <a:schemeClr val="lt2"/>
                         </a:solidFill>

</xml_diff>

<commit_message>
prep for next session
</commit_message>
<xml_diff>
--- a/format-encodings/documents/ARCHIVE/introduction-to-numbering-systems.pptx
+++ b/format-encodings/documents/ARCHIVE/introduction-to-numbering-systems.pptx
@@ -10313,190 +10313,6 @@
       </p:grpSpPr>
       <p:sp>
         <p:nvSpPr>
-          <p:cNvPr id="207" name="Google Shape;207;p24"/>
-          <p:cNvSpPr/>
-          <p:nvPr/>
-        </p:nvSpPr>
-        <p:spPr>
-          <a:xfrm>
-            <a:off x="2862025" y="1599200"/>
-            <a:ext cx="80100" cy="233400"/>
-          </a:xfrm>
-          <a:prstGeom prst="rect">
-            <a:avLst/>
-          </a:prstGeom>
-          <a:solidFill>
-            <a:schemeClr val="lt2"/>
-          </a:solidFill>
-          <a:ln w="9525" cap="flat" cmpd="sng">
-            <a:solidFill>
-              <a:schemeClr val="dk2"/>
-            </a:solidFill>
-            <a:prstDash val="solid"/>
-            <a:round/>
-            <a:headEnd type="none" w="sm" len="sm"/>
-            <a:tailEnd type="none" w="sm" len="sm"/>
-          </a:ln>
-        </p:spPr>
-        <p:txBody>
-          <a:bodyPr spcFirstLastPara="1" wrap="square" lIns="91425" tIns="91425" rIns="91425" bIns="91425" anchor="ctr" anchorCtr="0">
-            <a:noAutofit/>
-          </a:bodyPr>
-          <a:lstStyle/>
-          <a:p>
-            <a:pPr marL="0" lvl="0" indent="0" algn="l" rtl="0">
-              <a:spcBef>
-                <a:spcPts val="0"/>
-              </a:spcBef>
-              <a:spcAft>
-                <a:spcPts val="0"/>
-              </a:spcAft>
-              <a:buNone/>
-            </a:pPr>
-            <a:endParaRPr/>
-          </a:p>
-        </p:txBody>
-      </p:sp>
-      <p:sp>
-        <p:nvSpPr>
-          <p:cNvPr id="208" name="Google Shape;208;p24"/>
-          <p:cNvSpPr/>
-          <p:nvPr/>
-        </p:nvSpPr>
-        <p:spPr>
-          <a:xfrm>
-            <a:off x="4140750" y="1568750"/>
-            <a:ext cx="333300" cy="233400"/>
-          </a:xfrm>
-          <a:prstGeom prst="rect">
-            <a:avLst/>
-          </a:prstGeom>
-          <a:solidFill>
-            <a:schemeClr val="lt2"/>
-          </a:solidFill>
-          <a:ln w="9525" cap="flat" cmpd="sng">
-            <a:solidFill>
-              <a:schemeClr val="dk2"/>
-            </a:solidFill>
-            <a:prstDash val="solid"/>
-            <a:round/>
-            <a:headEnd type="none" w="sm" len="sm"/>
-            <a:tailEnd type="none" w="sm" len="sm"/>
-          </a:ln>
-        </p:spPr>
-        <p:txBody>
-          <a:bodyPr spcFirstLastPara="1" wrap="square" lIns="91425" tIns="91425" rIns="91425" bIns="91425" anchor="ctr" anchorCtr="0">
-            <a:noAutofit/>
-          </a:bodyPr>
-          <a:lstStyle/>
-          <a:p>
-            <a:pPr marL="0" lvl="0" indent="0" algn="l" rtl="0">
-              <a:spcBef>
-                <a:spcPts val="0"/>
-              </a:spcBef>
-              <a:spcAft>
-                <a:spcPts val="0"/>
-              </a:spcAft>
-              <a:buNone/>
-            </a:pPr>
-            <a:endParaRPr/>
-          </a:p>
-        </p:txBody>
-      </p:sp>
-      <p:sp>
-        <p:nvSpPr>
-          <p:cNvPr id="209" name="Google Shape;209;p24"/>
-          <p:cNvSpPr/>
-          <p:nvPr/>
-        </p:nvSpPr>
-        <p:spPr>
-          <a:xfrm>
-            <a:off x="2669200" y="1629650"/>
-            <a:ext cx="152100" cy="233400"/>
-          </a:xfrm>
-          <a:prstGeom prst="rect">
-            <a:avLst/>
-          </a:prstGeom>
-          <a:solidFill>
-            <a:schemeClr val="lt2"/>
-          </a:solidFill>
-          <a:ln w="9525" cap="flat" cmpd="sng">
-            <a:solidFill>
-              <a:schemeClr val="dk2"/>
-            </a:solidFill>
-            <a:prstDash val="solid"/>
-            <a:round/>
-            <a:headEnd type="none" w="sm" len="sm"/>
-            <a:tailEnd type="none" w="sm" len="sm"/>
-          </a:ln>
-        </p:spPr>
-        <p:txBody>
-          <a:bodyPr spcFirstLastPara="1" wrap="square" lIns="91425" tIns="91425" rIns="91425" bIns="91425" anchor="ctr" anchorCtr="0">
-            <a:noAutofit/>
-          </a:bodyPr>
-          <a:lstStyle/>
-          <a:p>
-            <a:pPr marL="0" lvl="0" indent="0" algn="l" rtl="0">
-              <a:spcBef>
-                <a:spcPts val="0"/>
-              </a:spcBef>
-              <a:spcAft>
-                <a:spcPts val="0"/>
-              </a:spcAft>
-              <a:buNone/>
-            </a:pPr>
-            <a:endParaRPr/>
-          </a:p>
-        </p:txBody>
-      </p:sp>
-      <p:sp>
-        <p:nvSpPr>
-          <p:cNvPr id="210" name="Google Shape;210;p24"/>
-          <p:cNvSpPr/>
-          <p:nvPr/>
-        </p:nvSpPr>
-        <p:spPr>
-          <a:xfrm>
-            <a:off x="3012300" y="1614650"/>
-            <a:ext cx="775800" cy="223200"/>
-          </a:xfrm>
-          <a:prstGeom prst="rect">
-            <a:avLst/>
-          </a:prstGeom>
-          <a:solidFill>
-            <a:schemeClr val="lt2"/>
-          </a:solidFill>
-          <a:ln w="9525" cap="flat" cmpd="sng">
-            <a:solidFill>
-              <a:schemeClr val="dk2"/>
-            </a:solidFill>
-            <a:prstDash val="solid"/>
-            <a:round/>
-            <a:headEnd type="none" w="sm" len="sm"/>
-            <a:tailEnd type="none" w="sm" len="sm"/>
-          </a:ln>
-        </p:spPr>
-        <p:txBody>
-          <a:bodyPr spcFirstLastPara="1" wrap="square" lIns="91425" tIns="91425" rIns="91425" bIns="91425" anchor="ctr" anchorCtr="0">
-            <a:noAutofit/>
-          </a:bodyPr>
-          <a:lstStyle/>
-          <a:p>
-            <a:pPr marL="0" lvl="0" indent="0" algn="l" rtl="0">
-              <a:spcBef>
-                <a:spcPts val="0"/>
-              </a:spcBef>
-              <a:spcAft>
-                <a:spcPts val="0"/>
-              </a:spcAft>
-              <a:buNone/>
-            </a:pPr>
-            <a:endParaRPr/>
-          </a:p>
-        </p:txBody>
-      </p:sp>
-      <p:sp>
-        <p:nvSpPr>
           <p:cNvPr id="211" name="Google Shape;211;p24"/>
           <p:cNvSpPr txBox="1">
             <a:spLocks noGrp="1"/>
@@ -10530,333 +10346,10 @@
               <a:buNone/>
             </a:pPr>
             <a:r>
-              <a:rPr lang="en"/>
+              <a:rPr lang="en" dirty="0"/>
               <a:t>Floating Point Encoding</a:t>
             </a:r>
-            <a:endParaRPr/>
-          </a:p>
-        </p:txBody>
-      </p:sp>
-      <p:sp>
-        <p:nvSpPr>
-          <p:cNvPr id="212" name="Google Shape;212;p24"/>
-          <p:cNvSpPr txBox="1">
-            <a:spLocks noGrp="1"/>
-          </p:cNvSpPr>
-          <p:nvPr>
-            <p:ph type="body" idx="1"/>
-          </p:nvPr>
-        </p:nvSpPr>
-        <p:spPr>
-          <a:xfrm>
-            <a:off x="311700" y="1152475"/>
-            <a:ext cx="8520600" cy="3416400"/>
-          </a:xfrm>
-          <a:prstGeom prst="rect">
-            <a:avLst/>
-          </a:prstGeom>
-        </p:spPr>
-        <p:txBody>
-          <a:bodyPr spcFirstLastPara="1" wrap="square" lIns="91425" tIns="91425" rIns="91425" bIns="91425" anchor="t" anchorCtr="0">
-            <a:normAutofit fontScale="85000" lnSpcReduction="20000"/>
-          </a:bodyPr>
-          <a:lstStyle/>
-          <a:p>
-            <a:pPr marL="0" lvl="0" indent="0" algn="l" rtl="0">
-              <a:spcBef>
-                <a:spcPts val="0"/>
-              </a:spcBef>
-              <a:spcAft>
-                <a:spcPts val="0"/>
-              </a:spcAft>
-              <a:buNone/>
-            </a:pPr>
-            <a:r>
-              <a:rPr lang="en" dirty="0"/>
-              <a:t>Original number: - 0.000100101</a:t>
-            </a:r>
             <a:endParaRPr dirty="0"/>
-          </a:p>
-          <a:p>
-            <a:pPr marL="0" lvl="0" indent="0" algn="l" rtl="0">
-              <a:spcBef>
-                <a:spcPts val="1200"/>
-              </a:spcBef>
-              <a:spcAft>
-                <a:spcPts val="0"/>
-              </a:spcAft>
-              <a:buNone/>
-            </a:pPr>
-            <a:r>
-              <a:rPr lang="en" dirty="0"/>
-              <a:t>Recall Scientific Notation:   - 1.00101  x 2 </a:t>
-            </a:r>
-            <a:r>
-              <a:rPr lang="en" baseline="30000" dirty="0"/>
-              <a:t>- 100 (4)</a:t>
-            </a:r>
-            <a:endParaRPr dirty="0"/>
-          </a:p>
-          <a:p>
-            <a:pPr marL="457200" lvl="0" indent="-325755" algn="l" rtl="0">
-              <a:spcBef>
-                <a:spcPts val="1200"/>
-              </a:spcBef>
-              <a:spcAft>
-                <a:spcPts val="0"/>
-              </a:spcAft>
-              <a:buSzPct val="100000"/>
-              <a:buChar char="●"/>
-            </a:pPr>
-            <a:r>
-              <a:rPr lang="en" dirty="0"/>
-              <a:t>Components to Encode</a:t>
-            </a:r>
-            <a:endParaRPr dirty="0"/>
-          </a:p>
-          <a:p>
-            <a:pPr marL="914400" lvl="1" indent="-304165" algn="l" rtl="0">
-              <a:spcBef>
-                <a:spcPts val="0"/>
-              </a:spcBef>
-              <a:spcAft>
-                <a:spcPts val="0"/>
-              </a:spcAft>
-              <a:buSzPct val="100000"/>
-              <a:buChar char="○"/>
-            </a:pPr>
-            <a:r>
-              <a:rPr lang="en" dirty="0"/>
-              <a:t>sign: negative </a:t>
-            </a:r>
-            <a:endParaRPr dirty="0"/>
-          </a:p>
-          <a:p>
-            <a:pPr marL="914400" lvl="1" indent="-304165" algn="l" rtl="0">
-              <a:spcBef>
-                <a:spcPts val="0"/>
-              </a:spcBef>
-              <a:spcAft>
-                <a:spcPts val="0"/>
-              </a:spcAft>
-              <a:buSzPct val="100000"/>
-              <a:buChar char="○"/>
-            </a:pPr>
-            <a:r>
-              <a:rPr lang="en" dirty="0"/>
-              <a:t>significant or the mantissa:  0100101</a:t>
-            </a:r>
-            <a:endParaRPr dirty="0"/>
-          </a:p>
-          <a:p>
-            <a:pPr marL="914400" lvl="1" indent="-304165" algn="l" rtl="0">
-              <a:spcBef>
-                <a:spcPts val="0"/>
-              </a:spcBef>
-              <a:spcAft>
-                <a:spcPts val="0"/>
-              </a:spcAft>
-              <a:buSzPct val="100000"/>
-              <a:buChar char="○"/>
-            </a:pPr>
-            <a:r>
-              <a:rPr lang="en" dirty="0"/>
-              <a:t>exponent: - 100    </a:t>
-            </a:r>
-            <a:endParaRPr dirty="0"/>
-          </a:p>
-          <a:p>
-            <a:pPr marL="1371600" lvl="2" indent="-304164" algn="l" rtl="0">
-              <a:spcBef>
-                <a:spcPts val="0"/>
-              </a:spcBef>
-              <a:spcAft>
-                <a:spcPts val="0"/>
-              </a:spcAft>
-              <a:buSzPct val="100000"/>
-              <a:buChar char="■"/>
-            </a:pPr>
-            <a:r>
-              <a:rPr lang="en" dirty="0"/>
-              <a:t>Issue:  negative exponents</a:t>
-            </a:r>
-            <a:endParaRPr dirty="0"/>
-          </a:p>
-          <a:p>
-            <a:pPr marL="1371600" lvl="2" indent="-304164" algn="l" rtl="0">
-              <a:spcBef>
-                <a:spcPts val="0"/>
-              </a:spcBef>
-              <a:spcAft>
-                <a:spcPts val="0"/>
-              </a:spcAft>
-              <a:buSzPct val="100000"/>
-              <a:buChar char="■"/>
-            </a:pPr>
-            <a:r>
-              <a:rPr lang="en" dirty="0"/>
-              <a:t>Solution: store values with a bias</a:t>
-            </a:r>
-            <a:endParaRPr dirty="0"/>
-          </a:p>
-          <a:p>
-            <a:pPr marL="457200" lvl="0" indent="-325755" algn="l" rtl="0">
-              <a:spcBef>
-                <a:spcPts val="0"/>
-              </a:spcBef>
-              <a:spcAft>
-                <a:spcPts val="0"/>
-              </a:spcAft>
-              <a:buSzPct val="100000"/>
-              <a:buChar char="●"/>
-            </a:pPr>
-            <a:r>
-              <a:rPr lang="en" dirty="0"/>
-              <a:t>Bias:</a:t>
-            </a:r>
-            <a:endParaRPr dirty="0"/>
-          </a:p>
-          <a:p>
-            <a:pPr marL="914400" lvl="1" indent="-304165" algn="l" rtl="0">
-              <a:spcBef>
-                <a:spcPts val="0"/>
-              </a:spcBef>
-              <a:spcAft>
-                <a:spcPts val="0"/>
-              </a:spcAft>
-              <a:buSzPct val="100000"/>
-              <a:buChar char="○"/>
-            </a:pPr>
-            <a:r>
-              <a:rPr lang="en" dirty="0"/>
-              <a:t>Shift all numbers along the number line by N</a:t>
-            </a:r>
-            <a:endParaRPr dirty="0"/>
-          </a:p>
-          <a:p>
-            <a:pPr marL="914400" lvl="1" indent="-304165" algn="l" rtl="0">
-              <a:spcBef>
-                <a:spcPts val="0"/>
-              </a:spcBef>
-              <a:spcAft>
-                <a:spcPts val="0"/>
-              </a:spcAft>
-              <a:buSzPct val="100000"/>
-              <a:buChar char="○"/>
-            </a:pPr>
-            <a:r>
-              <a:rPr lang="en" dirty="0"/>
-              <a:t>Typically it is half the range:</a:t>
-            </a:r>
-            <a:endParaRPr dirty="0"/>
-          </a:p>
-          <a:p>
-            <a:pPr marL="1371600" lvl="2" indent="-304164" algn="l" rtl="0">
-              <a:spcBef>
-                <a:spcPts val="0"/>
-              </a:spcBef>
-              <a:spcAft>
-                <a:spcPts val="0"/>
-              </a:spcAft>
-              <a:buSzPct val="100000"/>
-              <a:buChar char="■"/>
-            </a:pPr>
-            <a:r>
-              <a:rPr lang="en" dirty="0">
-                <a:latin typeface="Source Code Pro"/>
-                <a:ea typeface="Source Code Pro"/>
-                <a:cs typeface="Source Code Pro"/>
-                <a:sym typeface="Source Code Pro"/>
-              </a:rPr>
-              <a:t>3 bits -&gt;             011 == 3</a:t>
-            </a:r>
-            <a:endParaRPr dirty="0">
-              <a:latin typeface="Source Code Pro"/>
-              <a:ea typeface="Source Code Pro"/>
-              <a:cs typeface="Source Code Pro"/>
-              <a:sym typeface="Source Code Pro"/>
-            </a:endParaRPr>
-          </a:p>
-          <a:p>
-            <a:pPr marL="1371600" lvl="2" indent="-304164" algn="l" rtl="0">
-              <a:spcBef>
-                <a:spcPts val="0"/>
-              </a:spcBef>
-              <a:spcAft>
-                <a:spcPts val="0"/>
-              </a:spcAft>
-              <a:buSzPct val="100000"/>
-              <a:buChar char="■"/>
-            </a:pPr>
-            <a:r>
-              <a:rPr lang="en" dirty="0">
-                <a:latin typeface="Source Code Pro"/>
-                <a:ea typeface="Source Code Pro"/>
-                <a:cs typeface="Source Code Pro"/>
-                <a:sym typeface="Source Code Pro"/>
-              </a:rPr>
-              <a:t>5 bits -&gt;          0 1111 == 15</a:t>
-            </a:r>
-            <a:endParaRPr dirty="0">
-              <a:latin typeface="Source Code Pro"/>
-              <a:ea typeface="Source Code Pro"/>
-              <a:cs typeface="Source Code Pro"/>
-              <a:sym typeface="Source Code Pro"/>
-            </a:endParaRPr>
-          </a:p>
-          <a:p>
-            <a:pPr marL="1371600" lvl="2" indent="-304164" algn="l" rtl="0">
-              <a:spcBef>
-                <a:spcPts val="0"/>
-              </a:spcBef>
-              <a:spcAft>
-                <a:spcPts val="0"/>
-              </a:spcAft>
-              <a:buSzPct val="100000"/>
-              <a:buChar char="■"/>
-            </a:pPr>
-            <a:r>
-              <a:rPr lang="en" dirty="0">
-                <a:latin typeface="Source Code Pro"/>
-                <a:ea typeface="Source Code Pro"/>
-                <a:cs typeface="Source Code Pro"/>
-                <a:sym typeface="Source Code Pro"/>
-              </a:rPr>
-              <a:t>8 bits -&gt;       0111 1111 == 127</a:t>
-            </a:r>
-            <a:endParaRPr dirty="0">
-              <a:latin typeface="Source Code Pro"/>
-              <a:ea typeface="Source Code Pro"/>
-              <a:cs typeface="Source Code Pro"/>
-              <a:sym typeface="Source Code Pro"/>
-            </a:endParaRPr>
-          </a:p>
-          <a:p>
-            <a:pPr marL="1371600" lvl="2" indent="-304164" algn="l" rtl="0">
-              <a:spcBef>
-                <a:spcPts val="0"/>
-              </a:spcBef>
-              <a:spcAft>
-                <a:spcPts val="0"/>
-              </a:spcAft>
-              <a:buSzPct val="100000"/>
-              <a:buChar char="■"/>
-            </a:pPr>
-            <a:r>
-              <a:rPr lang="en" dirty="0">
-                <a:latin typeface="Source Code Pro"/>
-                <a:ea typeface="Source Code Pro"/>
-                <a:cs typeface="Source Code Pro"/>
-                <a:sym typeface="Source Code Pro"/>
-              </a:rPr>
-              <a:t>11 bits -&gt;  011 1111 1111 == 1023</a:t>
-            </a:r>
-            <a:endParaRPr dirty="0">
-              <a:latin typeface="Source Code Pro"/>
-              <a:ea typeface="Source Code Pro"/>
-              <a:cs typeface="Source Code Pro"/>
-              <a:sym typeface="Source Code Pro"/>
-            </a:endParaRPr>
           </a:p>
         </p:txBody>
       </p:sp>
@@ -10864,7 +10357,13 @@
         <p:nvGraphicFramePr>
           <p:cNvPr id="213" name="Google Shape;213;p24"/>
           <p:cNvGraphicFramePr/>
-          <p:nvPr/>
+          <p:nvPr>
+            <p:extLst>
+              <p:ext uri="{D42A27DB-BD31-4B8C-83A1-F6EECF244321}">
+                <p14:modId xmlns:p14="http://schemas.microsoft.com/office/powerpoint/2010/main" val="514842433"/>
+              </p:ext>
+            </p:extLst>
+          </p:nvPr>
         </p:nvGraphicFramePr>
         <p:xfrm>
           <a:off x="6167600" y="1315780"/>
@@ -12559,36 +12058,6 @@
       </p:sp>
       <p:cxnSp>
         <p:nvCxnSpPr>
-          <p:cNvPr id="218" name="Google Shape;218;p24"/>
-          <p:cNvCxnSpPr>
-            <a:endCxn id="217" idx="1"/>
-          </p:cNvCxnSpPr>
-          <p:nvPr/>
-        </p:nvCxnSpPr>
-        <p:spPr>
-          <a:xfrm rot="10800000" flipH="1">
-            <a:off x="2912850" y="624925"/>
-            <a:ext cx="1420800" cy="903300"/>
-          </a:xfrm>
-          <a:prstGeom prst="bentConnector3">
-            <a:avLst>
-              <a:gd name="adj1" fmla="val 74995"/>
-            </a:avLst>
-          </a:prstGeom>
-          <a:noFill/>
-          <a:ln w="9525" cap="flat" cmpd="sng">
-            <a:solidFill>
-              <a:schemeClr val="dk2"/>
-            </a:solidFill>
-            <a:prstDash val="solid"/>
-            <a:round/>
-            <a:headEnd type="none" w="med" len="med"/>
-            <a:tailEnd type="stealth" w="med" len="med"/>
-          </a:ln>
-        </p:spPr>
-      </p:cxnSp>
-      <p:cxnSp>
-        <p:nvCxnSpPr>
           <p:cNvPr id="219" name="Google Shape;219;p24"/>
           <p:cNvCxnSpPr/>
           <p:nvPr/>
@@ -12663,7 +12132,13 @@
         <p:nvGraphicFramePr>
           <p:cNvPr id="221" name="Google Shape;221;p24"/>
           <p:cNvGraphicFramePr/>
-          <p:nvPr/>
+          <p:nvPr>
+            <p:extLst>
+              <p:ext uri="{D42A27DB-BD31-4B8C-83A1-F6EECF244321}">
+                <p14:modId xmlns:p14="http://schemas.microsoft.com/office/powerpoint/2010/main" val="436857258"/>
+              </p:ext>
+            </p:extLst>
+          </p:nvPr>
         </p:nvGraphicFramePr>
         <p:xfrm>
           <a:off x="6516850" y="94405"/>
@@ -12994,6 +12469,544 @@
           </a:graphicData>
         </a:graphic>
       </p:graphicFrame>
+      <p:sp>
+        <p:nvSpPr>
+          <p:cNvPr id="207" name="Google Shape;207;p24"/>
+          <p:cNvSpPr/>
+          <p:nvPr/>
+        </p:nvSpPr>
+        <p:spPr>
+          <a:xfrm>
+            <a:off x="2862025" y="1607364"/>
+            <a:ext cx="80100" cy="233400"/>
+          </a:xfrm>
+          <a:prstGeom prst="rect">
+            <a:avLst/>
+          </a:prstGeom>
+          <a:solidFill>
+            <a:schemeClr val="lt2"/>
+          </a:solidFill>
+          <a:ln w="9525" cap="flat" cmpd="sng">
+            <a:solidFill>
+              <a:schemeClr val="dk2"/>
+            </a:solidFill>
+            <a:prstDash val="solid"/>
+            <a:round/>
+            <a:headEnd type="none" w="sm" len="sm"/>
+            <a:tailEnd type="none" w="sm" len="sm"/>
+          </a:ln>
+        </p:spPr>
+        <p:txBody>
+          <a:bodyPr spcFirstLastPara="1" wrap="square" lIns="91425" tIns="91425" rIns="91425" bIns="91425" anchor="ctr" anchorCtr="0">
+            <a:noAutofit/>
+          </a:bodyPr>
+          <a:lstStyle/>
+          <a:p>
+            <a:pPr marL="0" lvl="0" indent="0" algn="l" rtl="0">
+              <a:spcBef>
+                <a:spcPts val="0"/>
+              </a:spcBef>
+              <a:spcAft>
+                <a:spcPts val="0"/>
+              </a:spcAft>
+              <a:buNone/>
+            </a:pPr>
+            <a:endParaRPr/>
+          </a:p>
+        </p:txBody>
+      </p:sp>
+      <p:sp>
+        <p:nvSpPr>
+          <p:cNvPr id="208" name="Google Shape;208;p24"/>
+          <p:cNvSpPr/>
+          <p:nvPr/>
+        </p:nvSpPr>
+        <p:spPr>
+          <a:xfrm>
+            <a:off x="3943031" y="1560586"/>
+            <a:ext cx="571821" cy="233400"/>
+          </a:xfrm>
+          <a:prstGeom prst="rect">
+            <a:avLst/>
+          </a:prstGeom>
+          <a:solidFill>
+            <a:schemeClr val="lt2"/>
+          </a:solidFill>
+          <a:ln w="9525" cap="flat" cmpd="sng">
+            <a:solidFill>
+              <a:schemeClr val="dk2"/>
+            </a:solidFill>
+            <a:prstDash val="solid"/>
+            <a:round/>
+            <a:headEnd type="none" w="sm" len="sm"/>
+            <a:tailEnd type="none" w="sm" len="sm"/>
+          </a:ln>
+        </p:spPr>
+        <p:txBody>
+          <a:bodyPr spcFirstLastPara="1" wrap="square" lIns="91425" tIns="91425" rIns="91425" bIns="91425" anchor="ctr" anchorCtr="0">
+            <a:noAutofit/>
+          </a:bodyPr>
+          <a:lstStyle/>
+          <a:p>
+            <a:pPr marL="0" lvl="0" indent="0" algn="l" rtl="0">
+              <a:spcBef>
+                <a:spcPts val="0"/>
+              </a:spcBef>
+              <a:spcAft>
+                <a:spcPts val="0"/>
+              </a:spcAft>
+              <a:buNone/>
+            </a:pPr>
+            <a:endParaRPr dirty="0"/>
+          </a:p>
+        </p:txBody>
+      </p:sp>
+      <p:sp>
+        <p:nvSpPr>
+          <p:cNvPr id="209" name="Google Shape;209;p24"/>
+          <p:cNvSpPr/>
+          <p:nvPr/>
+        </p:nvSpPr>
+        <p:spPr>
+          <a:xfrm>
+            <a:off x="2669200" y="1629650"/>
+            <a:ext cx="152100" cy="233400"/>
+          </a:xfrm>
+          <a:prstGeom prst="rect">
+            <a:avLst/>
+          </a:prstGeom>
+          <a:solidFill>
+            <a:schemeClr val="lt2"/>
+          </a:solidFill>
+          <a:ln w="9525" cap="flat" cmpd="sng">
+            <a:solidFill>
+              <a:schemeClr val="dk2"/>
+            </a:solidFill>
+            <a:prstDash val="solid"/>
+            <a:round/>
+            <a:headEnd type="none" w="sm" len="sm"/>
+            <a:tailEnd type="none" w="sm" len="sm"/>
+          </a:ln>
+        </p:spPr>
+        <p:txBody>
+          <a:bodyPr spcFirstLastPara="1" wrap="square" lIns="91425" tIns="91425" rIns="91425" bIns="91425" anchor="ctr" anchorCtr="0">
+            <a:noAutofit/>
+          </a:bodyPr>
+          <a:lstStyle/>
+          <a:p>
+            <a:pPr marL="0" lvl="0" indent="0" algn="l" rtl="0">
+              <a:spcBef>
+                <a:spcPts val="0"/>
+              </a:spcBef>
+              <a:spcAft>
+                <a:spcPts val="0"/>
+              </a:spcAft>
+              <a:buNone/>
+            </a:pPr>
+            <a:endParaRPr/>
+          </a:p>
+        </p:txBody>
+      </p:sp>
+      <p:sp>
+        <p:nvSpPr>
+          <p:cNvPr id="210" name="Google Shape;210;p24"/>
+          <p:cNvSpPr/>
+          <p:nvPr/>
+        </p:nvSpPr>
+        <p:spPr>
+          <a:xfrm>
+            <a:off x="3012300" y="1614650"/>
+            <a:ext cx="571821" cy="223200"/>
+          </a:xfrm>
+          <a:prstGeom prst="rect">
+            <a:avLst/>
+          </a:prstGeom>
+          <a:solidFill>
+            <a:schemeClr val="lt2"/>
+          </a:solidFill>
+          <a:ln w="9525" cap="flat" cmpd="sng">
+            <a:solidFill>
+              <a:schemeClr val="dk2"/>
+            </a:solidFill>
+            <a:prstDash val="solid"/>
+            <a:round/>
+            <a:headEnd type="none" w="sm" len="sm"/>
+            <a:tailEnd type="none" w="sm" len="sm"/>
+          </a:ln>
+        </p:spPr>
+        <p:txBody>
+          <a:bodyPr spcFirstLastPara="1" wrap="square" lIns="91425" tIns="91425" rIns="91425" bIns="91425" anchor="ctr" anchorCtr="0">
+            <a:noAutofit/>
+          </a:bodyPr>
+          <a:lstStyle/>
+          <a:p>
+            <a:pPr marL="0" lvl="0" indent="0" algn="l" rtl="0">
+              <a:spcBef>
+                <a:spcPts val="0"/>
+              </a:spcBef>
+              <a:spcAft>
+                <a:spcPts val="0"/>
+              </a:spcAft>
+              <a:buNone/>
+            </a:pPr>
+            <a:endParaRPr/>
+          </a:p>
+        </p:txBody>
+      </p:sp>
+      <p:sp>
+        <p:nvSpPr>
+          <p:cNvPr id="212" name="Google Shape;212;p24"/>
+          <p:cNvSpPr txBox="1">
+            <a:spLocks noGrp="1"/>
+          </p:cNvSpPr>
+          <p:nvPr>
+            <p:ph type="body" idx="1"/>
+          </p:nvPr>
+        </p:nvSpPr>
+        <p:spPr>
+          <a:xfrm>
+            <a:off x="318274" y="1149158"/>
+            <a:ext cx="8520600" cy="3416400"/>
+          </a:xfrm>
+          <a:prstGeom prst="rect">
+            <a:avLst/>
+          </a:prstGeom>
+        </p:spPr>
+        <p:txBody>
+          <a:bodyPr spcFirstLastPara="1" wrap="square" lIns="91425" tIns="91425" rIns="91425" bIns="91425" anchor="t" anchorCtr="0">
+            <a:normAutofit fontScale="85000" lnSpcReduction="20000"/>
+          </a:bodyPr>
+          <a:lstStyle/>
+          <a:p>
+            <a:pPr marL="0" lvl="0" indent="0" algn="l" rtl="0">
+              <a:spcBef>
+                <a:spcPts val="0"/>
+              </a:spcBef>
+              <a:spcAft>
+                <a:spcPts val="0"/>
+              </a:spcAft>
+              <a:buNone/>
+            </a:pPr>
+            <a:r>
+              <a:rPr lang="en" dirty="0"/>
+              <a:t>Original number: - 0.000100101</a:t>
+            </a:r>
+            <a:endParaRPr dirty="0"/>
+          </a:p>
+          <a:p>
+            <a:pPr marL="0" lvl="0" indent="0" algn="l" rtl="0">
+              <a:spcBef>
+                <a:spcPts val="1200"/>
+              </a:spcBef>
+              <a:spcAft>
+                <a:spcPts val="0"/>
+              </a:spcAft>
+              <a:buNone/>
+            </a:pPr>
+            <a:r>
+              <a:rPr lang="en" dirty="0"/>
+              <a:t>Recall Scientific Notation:   - 1.00101  x 2 </a:t>
+            </a:r>
+            <a:r>
+              <a:rPr lang="en" baseline="30000" dirty="0"/>
+              <a:t>- 100 (4)</a:t>
+            </a:r>
+            <a:endParaRPr dirty="0"/>
+          </a:p>
+          <a:p>
+            <a:pPr marL="457200" lvl="0" indent="-325755" algn="l" rtl="0">
+              <a:spcBef>
+                <a:spcPts val="1200"/>
+              </a:spcBef>
+              <a:spcAft>
+                <a:spcPts val="0"/>
+              </a:spcAft>
+              <a:buSzPct val="100000"/>
+              <a:buChar char="●"/>
+            </a:pPr>
+            <a:r>
+              <a:rPr lang="en" dirty="0"/>
+              <a:t>Components to Encode</a:t>
+            </a:r>
+            <a:endParaRPr dirty="0"/>
+          </a:p>
+          <a:p>
+            <a:pPr marL="914400" lvl="1" indent="-304165" algn="l" rtl="0">
+              <a:spcBef>
+                <a:spcPts val="0"/>
+              </a:spcBef>
+              <a:spcAft>
+                <a:spcPts val="0"/>
+              </a:spcAft>
+              <a:buSzPct val="100000"/>
+              <a:buChar char="○"/>
+            </a:pPr>
+            <a:r>
+              <a:rPr lang="en" dirty="0"/>
+              <a:t>sign: negative </a:t>
+            </a:r>
+            <a:endParaRPr dirty="0"/>
+          </a:p>
+          <a:p>
+            <a:pPr marL="914400" lvl="1" indent="-304165" algn="l" rtl="0">
+              <a:spcBef>
+                <a:spcPts val="0"/>
+              </a:spcBef>
+              <a:spcAft>
+                <a:spcPts val="0"/>
+              </a:spcAft>
+              <a:buSzPct val="100000"/>
+              <a:buChar char="○"/>
+            </a:pPr>
+            <a:r>
+              <a:rPr lang="en" dirty="0"/>
+              <a:t>significant or the mantissa:  00101</a:t>
+            </a:r>
+            <a:endParaRPr dirty="0"/>
+          </a:p>
+          <a:p>
+            <a:pPr marL="914400" lvl="1" indent="-304165" algn="l" rtl="0">
+              <a:spcBef>
+                <a:spcPts val="0"/>
+              </a:spcBef>
+              <a:spcAft>
+                <a:spcPts val="0"/>
+              </a:spcAft>
+              <a:buSzPct val="100000"/>
+              <a:buChar char="○"/>
+            </a:pPr>
+            <a:r>
+              <a:rPr lang="en" dirty="0"/>
+              <a:t>exponent: - 100    </a:t>
+            </a:r>
+            <a:endParaRPr dirty="0"/>
+          </a:p>
+          <a:p>
+            <a:pPr marL="1371600" lvl="2" indent="-304164" algn="l" rtl="0">
+              <a:spcBef>
+                <a:spcPts val="0"/>
+              </a:spcBef>
+              <a:spcAft>
+                <a:spcPts val="0"/>
+              </a:spcAft>
+              <a:buSzPct val="100000"/>
+              <a:buChar char="■"/>
+            </a:pPr>
+            <a:r>
+              <a:rPr lang="en" dirty="0"/>
+              <a:t>Issue:  negative exponents</a:t>
+            </a:r>
+            <a:endParaRPr dirty="0"/>
+          </a:p>
+          <a:p>
+            <a:pPr marL="1371600" lvl="2" indent="-304164" algn="l" rtl="0">
+              <a:spcBef>
+                <a:spcPts val="0"/>
+              </a:spcBef>
+              <a:spcAft>
+                <a:spcPts val="0"/>
+              </a:spcAft>
+              <a:buSzPct val="100000"/>
+              <a:buChar char="■"/>
+            </a:pPr>
+            <a:r>
+              <a:rPr lang="en" dirty="0"/>
+              <a:t>Solution: store values with a bias</a:t>
+            </a:r>
+            <a:endParaRPr dirty="0"/>
+          </a:p>
+          <a:p>
+            <a:pPr marL="457200" lvl="0" indent="-325755" algn="l" rtl="0">
+              <a:spcBef>
+                <a:spcPts val="0"/>
+              </a:spcBef>
+              <a:spcAft>
+                <a:spcPts val="0"/>
+              </a:spcAft>
+              <a:buSzPct val="100000"/>
+              <a:buChar char="●"/>
+            </a:pPr>
+            <a:r>
+              <a:rPr lang="en" dirty="0"/>
+              <a:t>Bias:</a:t>
+            </a:r>
+            <a:endParaRPr dirty="0"/>
+          </a:p>
+          <a:p>
+            <a:pPr marL="914400" lvl="1" indent="-304165" algn="l" rtl="0">
+              <a:spcBef>
+                <a:spcPts val="0"/>
+              </a:spcBef>
+              <a:spcAft>
+                <a:spcPts val="0"/>
+              </a:spcAft>
+              <a:buSzPct val="100000"/>
+              <a:buChar char="○"/>
+            </a:pPr>
+            <a:r>
+              <a:rPr lang="en" dirty="0"/>
+              <a:t>Shift all numbers along the number line by N</a:t>
+            </a:r>
+            <a:endParaRPr dirty="0"/>
+          </a:p>
+          <a:p>
+            <a:pPr marL="914400" lvl="1" indent="-304165" algn="l" rtl="0">
+              <a:spcBef>
+                <a:spcPts val="0"/>
+              </a:spcBef>
+              <a:spcAft>
+                <a:spcPts val="0"/>
+              </a:spcAft>
+              <a:buSzPct val="100000"/>
+              <a:buChar char="○"/>
+            </a:pPr>
+            <a:r>
+              <a:rPr lang="en" dirty="0"/>
+              <a:t>Typically it is half the range:</a:t>
+            </a:r>
+            <a:endParaRPr dirty="0"/>
+          </a:p>
+          <a:p>
+            <a:pPr marL="1371600" lvl="2" indent="-304164" algn="l" rtl="0">
+              <a:spcBef>
+                <a:spcPts val="0"/>
+              </a:spcBef>
+              <a:spcAft>
+                <a:spcPts val="0"/>
+              </a:spcAft>
+              <a:buSzPct val="100000"/>
+              <a:buChar char="■"/>
+            </a:pPr>
+            <a:r>
+              <a:rPr lang="en" dirty="0">
+                <a:latin typeface="Source Code Pro"/>
+                <a:ea typeface="Source Code Pro"/>
+                <a:cs typeface="Source Code Pro"/>
+                <a:sym typeface="Source Code Pro"/>
+              </a:rPr>
+              <a:t>3 bits -&gt;             011 == 3</a:t>
+            </a:r>
+            <a:endParaRPr dirty="0">
+              <a:latin typeface="Source Code Pro"/>
+              <a:ea typeface="Source Code Pro"/>
+              <a:cs typeface="Source Code Pro"/>
+              <a:sym typeface="Source Code Pro"/>
+            </a:endParaRPr>
+          </a:p>
+          <a:p>
+            <a:pPr marL="1371600" lvl="2" indent="-304164" algn="l" rtl="0">
+              <a:spcBef>
+                <a:spcPts val="0"/>
+              </a:spcBef>
+              <a:spcAft>
+                <a:spcPts val="0"/>
+              </a:spcAft>
+              <a:buSzPct val="100000"/>
+              <a:buChar char="■"/>
+            </a:pPr>
+            <a:r>
+              <a:rPr lang="en" dirty="0">
+                <a:latin typeface="Source Code Pro"/>
+                <a:ea typeface="Source Code Pro"/>
+                <a:cs typeface="Source Code Pro"/>
+                <a:sym typeface="Source Code Pro"/>
+              </a:rPr>
+              <a:t>5 bits -&gt;          0 1111 == 15</a:t>
+            </a:r>
+            <a:endParaRPr dirty="0">
+              <a:latin typeface="Source Code Pro"/>
+              <a:ea typeface="Source Code Pro"/>
+              <a:cs typeface="Source Code Pro"/>
+              <a:sym typeface="Source Code Pro"/>
+            </a:endParaRPr>
+          </a:p>
+          <a:p>
+            <a:pPr marL="1371600" lvl="2" indent="-304164" algn="l" rtl="0">
+              <a:spcBef>
+                <a:spcPts val="0"/>
+              </a:spcBef>
+              <a:spcAft>
+                <a:spcPts val="0"/>
+              </a:spcAft>
+              <a:buSzPct val="100000"/>
+              <a:buChar char="■"/>
+            </a:pPr>
+            <a:r>
+              <a:rPr lang="en" dirty="0">
+                <a:latin typeface="Source Code Pro"/>
+                <a:ea typeface="Source Code Pro"/>
+                <a:cs typeface="Source Code Pro"/>
+                <a:sym typeface="Source Code Pro"/>
+              </a:rPr>
+              <a:t>8 bits -&gt;       0111 1111 == 127</a:t>
+            </a:r>
+            <a:endParaRPr dirty="0">
+              <a:latin typeface="Source Code Pro"/>
+              <a:ea typeface="Source Code Pro"/>
+              <a:cs typeface="Source Code Pro"/>
+              <a:sym typeface="Source Code Pro"/>
+            </a:endParaRPr>
+          </a:p>
+          <a:p>
+            <a:pPr marL="1371600" lvl="2" indent="-304164" algn="l" rtl="0">
+              <a:spcBef>
+                <a:spcPts val="0"/>
+              </a:spcBef>
+              <a:spcAft>
+                <a:spcPts val="0"/>
+              </a:spcAft>
+              <a:buSzPct val="100000"/>
+              <a:buChar char="■"/>
+            </a:pPr>
+            <a:r>
+              <a:rPr lang="en" dirty="0">
+                <a:latin typeface="Source Code Pro"/>
+                <a:ea typeface="Source Code Pro"/>
+                <a:cs typeface="Source Code Pro"/>
+                <a:sym typeface="Source Code Pro"/>
+              </a:rPr>
+              <a:t>11 bits -&gt;  011 1111 1111 == 1023</a:t>
+            </a:r>
+            <a:endParaRPr dirty="0">
+              <a:latin typeface="Source Code Pro"/>
+              <a:ea typeface="Source Code Pro"/>
+              <a:cs typeface="Source Code Pro"/>
+              <a:sym typeface="Source Code Pro"/>
+            </a:endParaRPr>
+          </a:p>
+        </p:txBody>
+      </p:sp>
+      <p:cxnSp>
+        <p:nvCxnSpPr>
+          <p:cNvPr id="218" name="Google Shape;218;p24"/>
+          <p:cNvCxnSpPr>
+            <a:cxnSpLocks/>
+            <a:endCxn id="217" idx="1"/>
+          </p:cNvCxnSpPr>
+          <p:nvPr/>
+        </p:nvCxnSpPr>
+        <p:spPr>
+          <a:xfrm flipV="1">
+            <a:off x="2976401" y="624925"/>
+            <a:ext cx="1357249" cy="911525"/>
+          </a:xfrm>
+          <a:prstGeom prst="bentConnector3">
+            <a:avLst>
+              <a:gd name="adj1" fmla="val 60226"/>
+            </a:avLst>
+          </a:prstGeom>
+          <a:noFill/>
+          <a:ln w="9525" cap="flat" cmpd="sng">
+            <a:solidFill>
+              <a:schemeClr val="dk2"/>
+            </a:solidFill>
+            <a:prstDash val="solid"/>
+            <a:round/>
+            <a:headEnd type="none" w="med" len="med"/>
+            <a:tailEnd type="stealth" w="med" len="med"/>
+          </a:ln>
+        </p:spPr>
+      </p:cxnSp>
     </p:spTree>
   </p:cSld>
   <p:clrMapOvr>

</xml_diff>